<commit_message>
updated log in proposal
</commit_message>
<xml_diff>
--- a/proposal/proposal.pptx
+++ b/proposal/proposal.pptx
@@ -264,7 +264,7 @@
           <a:p>
             <a:fld id="{D96F1AA1-7894-4225-AEAD-BF0CC163EC5B}" type="datetimeFigureOut">
               <a:rPr lang="en-US" smtClean="0"/>
-              <a:t>3/25/2025</a:t>
+              <a:t>3/26/2025</a:t>
             </a:fld>
             <a:endParaRPr lang="en-US"/>
           </a:p>
@@ -464,7 +464,7 @@
           <a:p>
             <a:fld id="{D96F1AA1-7894-4225-AEAD-BF0CC163EC5B}" type="datetimeFigureOut">
               <a:rPr lang="en-US" smtClean="0"/>
-              <a:t>3/25/2025</a:t>
+              <a:t>3/26/2025</a:t>
             </a:fld>
             <a:endParaRPr lang="en-US"/>
           </a:p>
@@ -674,7 +674,7 @@
           <a:p>
             <a:fld id="{D96F1AA1-7894-4225-AEAD-BF0CC163EC5B}" type="datetimeFigureOut">
               <a:rPr lang="en-US" smtClean="0"/>
-              <a:t>3/25/2025</a:t>
+              <a:t>3/26/2025</a:t>
             </a:fld>
             <a:endParaRPr lang="en-US"/>
           </a:p>
@@ -874,7 +874,7 @@
           <a:p>
             <a:fld id="{D96F1AA1-7894-4225-AEAD-BF0CC163EC5B}" type="datetimeFigureOut">
               <a:rPr lang="en-US" smtClean="0"/>
-              <a:t>3/25/2025</a:t>
+              <a:t>3/26/2025</a:t>
             </a:fld>
             <a:endParaRPr lang="en-US"/>
           </a:p>
@@ -1150,7 +1150,7 @@
           <a:p>
             <a:fld id="{D96F1AA1-7894-4225-AEAD-BF0CC163EC5B}" type="datetimeFigureOut">
               <a:rPr lang="en-US" smtClean="0"/>
-              <a:t>3/25/2025</a:t>
+              <a:t>3/26/2025</a:t>
             </a:fld>
             <a:endParaRPr lang="en-US"/>
           </a:p>
@@ -1418,7 +1418,7 @@
           <a:p>
             <a:fld id="{D96F1AA1-7894-4225-AEAD-BF0CC163EC5B}" type="datetimeFigureOut">
               <a:rPr lang="en-US" smtClean="0"/>
-              <a:t>3/25/2025</a:t>
+              <a:t>3/26/2025</a:t>
             </a:fld>
             <a:endParaRPr lang="en-US"/>
           </a:p>
@@ -1833,7 +1833,7 @@
           <a:p>
             <a:fld id="{D96F1AA1-7894-4225-AEAD-BF0CC163EC5B}" type="datetimeFigureOut">
               <a:rPr lang="en-US" smtClean="0"/>
-              <a:t>3/25/2025</a:t>
+              <a:t>3/26/2025</a:t>
             </a:fld>
             <a:endParaRPr lang="en-US"/>
           </a:p>
@@ -1975,7 +1975,7 @@
           <a:p>
             <a:fld id="{D96F1AA1-7894-4225-AEAD-BF0CC163EC5B}" type="datetimeFigureOut">
               <a:rPr lang="en-US" smtClean="0"/>
-              <a:t>3/25/2025</a:t>
+              <a:t>3/26/2025</a:t>
             </a:fld>
             <a:endParaRPr lang="en-US"/>
           </a:p>
@@ -2088,7 +2088,7 @@
           <a:p>
             <a:fld id="{D96F1AA1-7894-4225-AEAD-BF0CC163EC5B}" type="datetimeFigureOut">
               <a:rPr lang="en-US" smtClean="0"/>
-              <a:t>3/25/2025</a:t>
+              <a:t>3/26/2025</a:t>
             </a:fld>
             <a:endParaRPr lang="en-US"/>
           </a:p>
@@ -2401,7 +2401,7 @@
           <a:p>
             <a:fld id="{D96F1AA1-7894-4225-AEAD-BF0CC163EC5B}" type="datetimeFigureOut">
               <a:rPr lang="en-US" smtClean="0"/>
-              <a:t>3/25/2025</a:t>
+              <a:t>3/26/2025</a:t>
             </a:fld>
             <a:endParaRPr lang="en-US"/>
           </a:p>
@@ -2690,7 +2690,7 @@
           <a:p>
             <a:fld id="{D96F1AA1-7894-4225-AEAD-BF0CC163EC5B}" type="datetimeFigureOut">
               <a:rPr lang="en-US" smtClean="0"/>
-              <a:t>3/25/2025</a:t>
+              <a:t>3/26/2025</a:t>
             </a:fld>
             <a:endParaRPr lang="en-US"/>
           </a:p>
@@ -2933,7 +2933,7 @@
           <a:p>
             <a:fld id="{D96F1AA1-7894-4225-AEAD-BF0CC163EC5B}" type="datetimeFigureOut">
               <a:rPr lang="en-US" smtClean="0"/>
-              <a:t>3/25/2025</a:t>
+              <a:t>3/26/2025</a:t>
             </a:fld>
             <a:endParaRPr lang="en-US"/>
           </a:p>
@@ -3749,11 +3749,22 @@
           <a:p>
             <a:r>
               <a:rPr lang="en-US" dirty="0"/>
-              <a:t>[3/15/2025]: Converted census tract CSV to </a:t>
+              <a:t>[3/25/2025]: Converted census tract CSV to </a:t>
+            </a:r>
+            <a:r>
+              <a:rPr lang="en-US" dirty="0" err="1"/>
+              <a:t>shp</a:t>
+            </a:r>
+            <a:endParaRPr lang="en-US" dirty="0"/>
+          </a:p>
+          <a:p>
+            <a:r>
+              <a:rPr lang="en-US" dirty="0"/>
+              <a:t>[3/26/2025]: Adjusted sampling strategy, worked out Kriging </a:t>
             </a:r>
             <a:r>
               <a:rPr lang="en-US"/>
-              <a:t>shp</a:t>
+              <a:t>interpolation workflow</a:t>
             </a:r>
             <a:endParaRPr lang="en-US" dirty="0"/>
           </a:p>

</xml_diff>